<commit_message>
Linear Regression from Scratch
</commit_message>
<xml_diff>
--- a/Dive into Deep Learning/2. Linear Regression-CH.pptx
+++ b/Dive into Deep Learning/2. Linear Regression-CH.pptx
@@ -5,7 +5,7 @@
     <p:sldMasterId id="2147483648" r:id="rId1"/>
   </p:sldMasterIdLst>
   <p:notesMasterIdLst>
-    <p:notesMasterId r:id="rId16"/>
+    <p:notesMasterId r:id="rId15"/>
   </p:notesMasterIdLst>
   <p:sldIdLst>
     <p:sldId id="265" r:id="rId2"/>
@@ -18,10 +18,9 @@
     <p:sldId id="326" r:id="rId9"/>
     <p:sldId id="327" r:id="rId10"/>
     <p:sldId id="329" r:id="rId11"/>
-    <p:sldId id="331" r:id="rId12"/>
-    <p:sldId id="333" r:id="rId13"/>
-    <p:sldId id="285" r:id="rId14"/>
-    <p:sldId id="286" r:id="rId15"/>
+    <p:sldId id="333" r:id="rId12"/>
+    <p:sldId id="285" r:id="rId13"/>
+    <p:sldId id="286" r:id="rId14"/>
   </p:sldIdLst>
   <p:sldSz cx="12192000" cy="6858000"/>
   <p:notesSz cx="6858000" cy="9144000"/>
@@ -210,7 +209,7 @@
           <a:p>
             <a:fld id="{0D3578DB-0091-4EF0-9620-E708B7FBB15F}" type="datetimeFigureOut">
               <a:rPr lang="en-US" smtClean="0"/>
-              <a:t>9/27/2019</a:t>
+              <a:t>10/2/2019</a:t>
             </a:fld>
             <a:endParaRPr lang="en-US"/>
           </a:p>
@@ -731,7 +730,7 @@
   <p:cSld>
     <p:spTree>
       <p:nvGrpSpPr>
-        <p:cNvPr id="1" name="Shape 166"/>
+        <p:cNvPr id="1" name="Shape 173"/>
         <p:cNvGrpSpPr/>
         <p:nvPr/>
       </p:nvGrpSpPr>
@@ -745,7 +744,7 @@
       </p:grpSpPr>
       <p:sp>
         <p:nvSpPr>
-          <p:cNvPr id="167" name="Google Shape;167;p3:notes"/>
+          <p:cNvPr id="174" name="Google Shape;174;p4:notes"/>
           <p:cNvSpPr>
             <a:spLocks noGrp="1" noRot="1" noChangeAspect="1"/>
           </p:cNvSpPr>
@@ -796,7 +795,7 @@
       </p:sp>
       <p:sp>
         <p:nvSpPr>
-          <p:cNvPr id="168" name="Google Shape;168;p3:notes"/>
+          <p:cNvPr id="175" name="Google Shape;175;p4:notes"/>
           <p:cNvSpPr txBox="1">
             <a:spLocks noGrp="1"/>
           </p:cNvSpPr>
@@ -843,7 +842,7 @@
     </p:spTree>
     <p:extLst>
       <p:ext uri="{BB962C8B-B14F-4D97-AF65-F5344CB8AC3E}">
-        <p14:creationId xmlns:p14="http://schemas.microsoft.com/office/powerpoint/2010/main" val="2141551062"/>
+        <p14:creationId xmlns:p14="http://schemas.microsoft.com/office/powerpoint/2010/main" val="2041379299"/>
       </p:ext>
     </p:extLst>
   </p:cSld>
@@ -858,7 +857,7 @@
   <p:cSld>
     <p:spTree>
       <p:nvGrpSpPr>
-        <p:cNvPr id="1" name="Shape 173"/>
+        <p:cNvPr id="1" name="Shape 5403"/>
         <p:cNvGrpSpPr/>
         <p:nvPr/>
       </p:nvGrpSpPr>
@@ -872,7 +871,7 @@
       </p:grpSpPr>
       <p:sp>
         <p:nvSpPr>
-          <p:cNvPr id="174" name="Google Shape;174;p4:notes"/>
+          <p:cNvPr id="5404" name="Google Shape;5404;p31:notes"/>
           <p:cNvSpPr>
             <a:spLocks noGrp="1" noRot="1" noChangeAspect="1"/>
           </p:cNvSpPr>
@@ -923,7 +922,7 @@
       </p:sp>
       <p:sp>
         <p:nvSpPr>
-          <p:cNvPr id="175" name="Google Shape;175;p4:notes"/>
+          <p:cNvPr id="5405" name="Google Shape;5405;p31:notes"/>
           <p:cNvSpPr txBox="1">
             <a:spLocks noGrp="1"/>
           </p:cNvSpPr>
@@ -968,11 +967,6 @@
         </p:txBody>
       </p:sp>
     </p:spTree>
-    <p:extLst>
-      <p:ext uri="{BB962C8B-B14F-4D97-AF65-F5344CB8AC3E}">
-        <p14:creationId xmlns:p14="http://schemas.microsoft.com/office/powerpoint/2010/main" val="2041379299"/>
-      </p:ext>
-    </p:extLst>
   </p:cSld>
   <p:clrMapOvr>
     <a:masterClrMapping/>
@@ -985,7 +979,7 @@
   <p:cSld>
     <p:spTree>
       <p:nvGrpSpPr>
-        <p:cNvPr id="1" name="Shape 5403"/>
+        <p:cNvPr id="1" name="Shape 5409"/>
         <p:cNvGrpSpPr/>
         <p:nvPr/>
       </p:nvGrpSpPr>
@@ -999,7 +993,7 @@
       </p:grpSpPr>
       <p:sp>
         <p:nvSpPr>
-          <p:cNvPr id="5404" name="Google Shape;5404;p31:notes"/>
+          <p:cNvPr id="5410" name="Google Shape;5410;p30:notes"/>
           <p:cNvSpPr>
             <a:spLocks noGrp="1" noRot="1" noChangeAspect="1"/>
           </p:cNvSpPr>
@@ -1050,7 +1044,7 @@
       </p:sp>
       <p:sp>
         <p:nvSpPr>
-          <p:cNvPr id="5405" name="Google Shape;5405;p31:notes"/>
+          <p:cNvPr id="5411" name="Google Shape;5411;p30:notes"/>
           <p:cNvSpPr txBox="1">
             <a:spLocks noGrp="1"/>
           </p:cNvSpPr>
@@ -1102,12 +1096,12 @@
 </p:notes>
 </file>
 
-<file path=ppt/notesSlides/notesSlide14.xml><?xml version="1.0" encoding="utf-8"?>
+<file path=ppt/notesSlides/notesSlide2.xml><?xml version="1.0" encoding="utf-8"?>
 <p:notes xmlns:a="http://schemas.openxmlformats.org/drawingml/2006/main" xmlns:r="http://schemas.openxmlformats.org/officeDocument/2006/relationships" xmlns:p="http://schemas.openxmlformats.org/presentationml/2006/main" showMasterSp="0" showMasterPhAnim="0">
   <p:cSld>
     <p:spTree>
       <p:nvGrpSpPr>
-        <p:cNvPr id="1" name="Shape 5409"/>
+        <p:cNvPr id="1" name="Shape 173"/>
         <p:cNvGrpSpPr/>
         <p:nvPr/>
       </p:nvGrpSpPr>
@@ -1121,7 +1115,7 @@
       </p:grpSpPr>
       <p:sp>
         <p:nvSpPr>
-          <p:cNvPr id="5410" name="Google Shape;5410;p30:notes"/>
+          <p:cNvPr id="174" name="Google Shape;174;p4:notes"/>
           <p:cNvSpPr>
             <a:spLocks noGrp="1" noRot="1" noChangeAspect="1"/>
           </p:cNvSpPr>
@@ -1172,7 +1166,7 @@
       </p:sp>
       <p:sp>
         <p:nvSpPr>
-          <p:cNvPr id="5411" name="Google Shape;5411;p30:notes"/>
+          <p:cNvPr id="175" name="Google Shape;175;p4:notes"/>
           <p:cNvSpPr txBox="1">
             <a:spLocks noGrp="1"/>
           </p:cNvSpPr>
@@ -1217,6 +1211,11 @@
         </p:txBody>
       </p:sp>
     </p:spTree>
+    <p:extLst>
+      <p:ext uri="{BB962C8B-B14F-4D97-AF65-F5344CB8AC3E}">
+        <p14:creationId xmlns:p14="http://schemas.microsoft.com/office/powerpoint/2010/main" val="3176422395"/>
+      </p:ext>
+    </p:extLst>
   </p:cSld>
   <p:clrMapOvr>
     <a:masterClrMapping/>
@@ -1224,7 +1223,7 @@
 </p:notes>
 </file>
 
-<file path=ppt/notesSlides/notesSlide2.xml><?xml version="1.0" encoding="utf-8"?>
+<file path=ppt/notesSlides/notesSlide3.xml><?xml version="1.0" encoding="utf-8"?>
 <p:notes xmlns:a="http://schemas.openxmlformats.org/drawingml/2006/main" xmlns:r="http://schemas.openxmlformats.org/officeDocument/2006/relationships" xmlns:p="http://schemas.openxmlformats.org/presentationml/2006/main" showMasterSp="0" showMasterPhAnim="0">
   <p:cSld>
     <p:spTree>
@@ -1341,7 +1340,7 @@
     </p:spTree>
     <p:extLst>
       <p:ext uri="{BB962C8B-B14F-4D97-AF65-F5344CB8AC3E}">
-        <p14:creationId xmlns:p14="http://schemas.microsoft.com/office/powerpoint/2010/main" val="3176422395"/>
+        <p14:creationId xmlns:p14="http://schemas.microsoft.com/office/powerpoint/2010/main" val="853556014"/>
       </p:ext>
     </p:extLst>
   </p:cSld>
@@ -1351,12 +1350,12 @@
 </p:notes>
 </file>
 
-<file path=ppt/notesSlides/notesSlide3.xml><?xml version="1.0" encoding="utf-8"?>
+<file path=ppt/notesSlides/notesSlide4.xml><?xml version="1.0" encoding="utf-8"?>
 <p:notes xmlns:a="http://schemas.openxmlformats.org/drawingml/2006/main" xmlns:r="http://schemas.openxmlformats.org/officeDocument/2006/relationships" xmlns:p="http://schemas.openxmlformats.org/presentationml/2006/main" showMasterSp="0" showMasterPhAnim="0">
   <p:cSld>
     <p:spTree>
       <p:nvGrpSpPr>
-        <p:cNvPr id="1" name="Shape 173"/>
+        <p:cNvPr id="1" name="Shape 166"/>
         <p:cNvGrpSpPr/>
         <p:nvPr/>
       </p:nvGrpSpPr>
@@ -1370,7 +1369,7 @@
       </p:grpSpPr>
       <p:sp>
         <p:nvSpPr>
-          <p:cNvPr id="174" name="Google Shape;174;p4:notes"/>
+          <p:cNvPr id="167" name="Google Shape;167;p3:notes"/>
           <p:cNvSpPr>
             <a:spLocks noGrp="1" noRot="1" noChangeAspect="1"/>
           </p:cNvSpPr>
@@ -1421,7 +1420,7 @@
       </p:sp>
       <p:sp>
         <p:nvSpPr>
-          <p:cNvPr id="175" name="Google Shape;175;p4:notes"/>
+          <p:cNvPr id="168" name="Google Shape;168;p3:notes"/>
           <p:cNvSpPr txBox="1">
             <a:spLocks noGrp="1"/>
           </p:cNvSpPr>
@@ -1466,11 +1465,6 @@
         </p:txBody>
       </p:sp>
     </p:spTree>
-    <p:extLst>
-      <p:ext uri="{BB962C8B-B14F-4D97-AF65-F5344CB8AC3E}">
-        <p14:creationId xmlns:p14="http://schemas.microsoft.com/office/powerpoint/2010/main" val="853556014"/>
-      </p:ext>
-    </p:extLst>
   </p:cSld>
   <p:clrMapOvr>
     <a:masterClrMapping/>
@@ -1478,7 +1472,7 @@
 </p:notes>
 </file>
 
-<file path=ppt/notesSlides/notesSlide4.xml><?xml version="1.0" encoding="utf-8"?>
+<file path=ppt/notesSlides/notesSlide5.xml><?xml version="1.0" encoding="utf-8"?>
 <p:notes xmlns:a="http://schemas.openxmlformats.org/drawingml/2006/main" xmlns:r="http://schemas.openxmlformats.org/officeDocument/2006/relationships" xmlns:p="http://schemas.openxmlformats.org/presentationml/2006/main" showMasterSp="0" showMasterPhAnim="0">
   <p:cSld>
     <p:spTree>
@@ -1593,6 +1587,11 @@
         </p:txBody>
       </p:sp>
     </p:spTree>
+    <p:extLst>
+      <p:ext uri="{BB962C8B-B14F-4D97-AF65-F5344CB8AC3E}">
+        <p14:creationId xmlns:p14="http://schemas.microsoft.com/office/powerpoint/2010/main" val="3442462624"/>
+      </p:ext>
+    </p:extLst>
   </p:cSld>
   <p:clrMapOvr>
     <a:masterClrMapping/>
@@ -1600,12 +1599,12 @@
 </p:notes>
 </file>
 
-<file path=ppt/notesSlides/notesSlide5.xml><?xml version="1.0" encoding="utf-8"?>
+<file path=ppt/notesSlides/notesSlide6.xml><?xml version="1.0" encoding="utf-8"?>
 <p:notes xmlns:a="http://schemas.openxmlformats.org/drawingml/2006/main" xmlns:r="http://schemas.openxmlformats.org/officeDocument/2006/relationships" xmlns:p="http://schemas.openxmlformats.org/presentationml/2006/main" showMasterSp="0" showMasterPhAnim="0">
   <p:cSld>
     <p:spTree>
       <p:nvGrpSpPr>
-        <p:cNvPr id="1" name="Shape 166"/>
+        <p:cNvPr id="1" name="Shape 173"/>
         <p:cNvGrpSpPr/>
         <p:nvPr/>
       </p:nvGrpSpPr>
@@ -1619,7 +1618,7 @@
       </p:grpSpPr>
       <p:sp>
         <p:nvSpPr>
-          <p:cNvPr id="167" name="Google Shape;167;p3:notes"/>
+          <p:cNvPr id="174" name="Google Shape;174;p4:notes"/>
           <p:cNvSpPr>
             <a:spLocks noGrp="1" noRot="1" noChangeAspect="1"/>
           </p:cNvSpPr>
@@ -1670,7 +1669,7 @@
       </p:sp>
       <p:sp>
         <p:nvSpPr>
-          <p:cNvPr id="168" name="Google Shape;168;p3:notes"/>
+          <p:cNvPr id="175" name="Google Shape;175;p4:notes"/>
           <p:cNvSpPr txBox="1">
             <a:spLocks noGrp="1"/>
           </p:cNvSpPr>
@@ -1717,7 +1716,7 @@
     </p:spTree>
     <p:extLst>
       <p:ext uri="{BB962C8B-B14F-4D97-AF65-F5344CB8AC3E}">
-        <p14:creationId xmlns:p14="http://schemas.microsoft.com/office/powerpoint/2010/main" val="3442462624"/>
+        <p14:creationId xmlns:p14="http://schemas.microsoft.com/office/powerpoint/2010/main" val="4147871849"/>
       </p:ext>
     </p:extLst>
   </p:cSld>
@@ -1727,7 +1726,7 @@
 </p:notes>
 </file>
 
-<file path=ppt/notesSlides/notesSlide6.xml><?xml version="1.0" encoding="utf-8"?>
+<file path=ppt/notesSlides/notesSlide7.xml><?xml version="1.0" encoding="utf-8"?>
 <p:notes xmlns:a="http://schemas.openxmlformats.org/drawingml/2006/main" xmlns:r="http://schemas.openxmlformats.org/officeDocument/2006/relationships" xmlns:p="http://schemas.openxmlformats.org/presentationml/2006/main" showMasterSp="0" showMasterPhAnim="0">
   <p:cSld>
     <p:spTree>
@@ -1844,7 +1843,7 @@
     </p:spTree>
     <p:extLst>
       <p:ext uri="{BB962C8B-B14F-4D97-AF65-F5344CB8AC3E}">
-        <p14:creationId xmlns:p14="http://schemas.microsoft.com/office/powerpoint/2010/main" val="4147871849"/>
+        <p14:creationId xmlns:p14="http://schemas.microsoft.com/office/powerpoint/2010/main" val="3838413775"/>
       </p:ext>
     </p:extLst>
   </p:cSld>
@@ -1854,7 +1853,7 @@
 </p:notes>
 </file>
 
-<file path=ppt/notesSlides/notesSlide7.xml><?xml version="1.0" encoding="utf-8"?>
+<file path=ppt/notesSlides/notesSlide8.xml><?xml version="1.0" encoding="utf-8"?>
 <p:notes xmlns:a="http://schemas.openxmlformats.org/drawingml/2006/main" xmlns:r="http://schemas.openxmlformats.org/officeDocument/2006/relationships" xmlns:p="http://schemas.openxmlformats.org/presentationml/2006/main" showMasterSp="0" showMasterPhAnim="0">
   <p:cSld>
     <p:spTree>
@@ -1971,7 +1970,7 @@
     </p:spTree>
     <p:extLst>
       <p:ext uri="{BB962C8B-B14F-4D97-AF65-F5344CB8AC3E}">
-        <p14:creationId xmlns:p14="http://schemas.microsoft.com/office/powerpoint/2010/main" val="3838413775"/>
+        <p14:creationId xmlns:p14="http://schemas.microsoft.com/office/powerpoint/2010/main" val="2811060025"/>
       </p:ext>
     </p:extLst>
   </p:cSld>
@@ -1981,7 +1980,7 @@
 </p:notes>
 </file>
 
-<file path=ppt/notesSlides/notesSlide8.xml><?xml version="1.0" encoding="utf-8"?>
+<file path=ppt/notesSlides/notesSlide9.xml><?xml version="1.0" encoding="utf-8"?>
 <p:notes xmlns:a="http://schemas.openxmlformats.org/drawingml/2006/main" xmlns:r="http://schemas.openxmlformats.org/officeDocument/2006/relationships" xmlns:p="http://schemas.openxmlformats.org/presentationml/2006/main" showMasterSp="0" showMasterPhAnim="0">
   <p:cSld>
     <p:spTree>
@@ -2098,133 +2097,6 @@
     </p:spTree>
     <p:extLst>
       <p:ext uri="{BB962C8B-B14F-4D97-AF65-F5344CB8AC3E}">
-        <p14:creationId xmlns:p14="http://schemas.microsoft.com/office/powerpoint/2010/main" val="2811060025"/>
-      </p:ext>
-    </p:extLst>
-  </p:cSld>
-  <p:clrMapOvr>
-    <a:masterClrMapping/>
-  </p:clrMapOvr>
-</p:notes>
-</file>
-
-<file path=ppt/notesSlides/notesSlide9.xml><?xml version="1.0" encoding="utf-8"?>
-<p:notes xmlns:a="http://schemas.openxmlformats.org/drawingml/2006/main" xmlns:r="http://schemas.openxmlformats.org/officeDocument/2006/relationships" xmlns:p="http://schemas.openxmlformats.org/presentationml/2006/main" showMasterSp="0" showMasterPhAnim="0">
-  <p:cSld>
-    <p:spTree>
-      <p:nvGrpSpPr>
-        <p:cNvPr id="1" name="Shape 173"/>
-        <p:cNvGrpSpPr/>
-        <p:nvPr/>
-      </p:nvGrpSpPr>
-      <p:grpSpPr>
-        <a:xfrm>
-          <a:off x="0" y="0"/>
-          <a:ext cx="0" cy="0"/>
-          <a:chOff x="0" y="0"/>
-          <a:chExt cx="0" cy="0"/>
-        </a:xfrm>
-      </p:grpSpPr>
-      <p:sp>
-        <p:nvSpPr>
-          <p:cNvPr id="174" name="Google Shape;174;p4:notes"/>
-          <p:cNvSpPr>
-            <a:spLocks noGrp="1" noRot="1" noChangeAspect="1"/>
-          </p:cNvSpPr>
-          <p:nvPr>
-            <p:ph type="sldImg" idx="2"/>
-          </p:nvPr>
-        </p:nvSpPr>
-        <p:spPr>
-          <a:xfrm>
-            <a:off x="381000" y="685800"/>
-            <a:ext cx="6096000" cy="3429000"/>
-          </a:xfrm>
-          <a:custGeom>
-            <a:avLst/>
-            <a:gdLst/>
-            <a:ahLst/>
-            <a:cxnLst/>
-            <a:rect l="l" t="t" r="r" b="b"/>
-            <a:pathLst>
-              <a:path w="120000" h="120000" extrusionOk="0">
-                <a:moveTo>
-                  <a:pt x="0" y="0"/>
-                </a:moveTo>
-                <a:lnTo>
-                  <a:pt x="120000" y="0"/>
-                </a:lnTo>
-                <a:lnTo>
-                  <a:pt x="120000" y="120000"/>
-                </a:lnTo>
-                <a:lnTo>
-                  <a:pt x="0" y="120000"/>
-                </a:lnTo>
-                <a:close/>
-              </a:path>
-            </a:pathLst>
-          </a:custGeom>
-          <a:noFill/>
-          <a:ln w="9525" cap="flat" cmpd="sng">
-            <a:solidFill>
-              <a:srgbClr val="000000"/>
-            </a:solidFill>
-            <a:prstDash val="solid"/>
-            <a:round/>
-            <a:headEnd type="none" w="sm" len="sm"/>
-            <a:tailEnd type="none" w="sm" len="sm"/>
-          </a:ln>
-        </p:spPr>
-      </p:sp>
-      <p:sp>
-        <p:nvSpPr>
-          <p:cNvPr id="175" name="Google Shape;175;p4:notes"/>
-          <p:cNvSpPr txBox="1">
-            <a:spLocks noGrp="1"/>
-          </p:cNvSpPr>
-          <p:nvPr>
-            <p:ph type="body" idx="1"/>
-          </p:nvPr>
-        </p:nvSpPr>
-        <p:spPr>
-          <a:xfrm>
-            <a:off x="685800" y="4343400"/>
-            <a:ext cx="5486400" cy="4114800"/>
-          </a:xfrm>
-          <a:prstGeom prst="rect">
-            <a:avLst/>
-          </a:prstGeom>
-          <a:noFill/>
-          <a:ln>
-            <a:noFill/>
-          </a:ln>
-        </p:spPr>
-        <p:txBody>
-          <a:bodyPr spcFirstLastPara="1" wrap="square" lIns="91425" tIns="91425" rIns="91425" bIns="91425" anchor="t" anchorCtr="0">
-            <a:noAutofit/>
-          </a:bodyPr>
-          <a:lstStyle/>
-          <a:p>
-            <a:pPr marL="0" lvl="0" indent="0" algn="l" rtl="0">
-              <a:lnSpc>
-                <a:spcPct val="100000"/>
-              </a:lnSpc>
-              <a:spcBef>
-                <a:spcPts val="0"/>
-              </a:spcBef>
-              <a:spcAft>
-                <a:spcPts val="0"/>
-              </a:spcAft>
-              <a:buSzPts val="1100"/>
-              <a:buNone/>
-            </a:pPr>
-            <a:endParaRPr/>
-          </a:p>
-        </p:txBody>
-      </p:sp>
-    </p:spTree>
-    <p:extLst>
-      <p:ext uri="{BB962C8B-B14F-4D97-AF65-F5344CB8AC3E}">
         <p14:creationId xmlns:p14="http://schemas.microsoft.com/office/powerpoint/2010/main" val="3422402915"/>
       </p:ext>
     </p:extLst>
@@ -2382,7 +2254,7 @@
           <a:p>
             <a:fld id="{23EC023D-B61A-4551-8136-DCD5A45A20F2}" type="datetimeFigureOut">
               <a:rPr lang="en-US" smtClean="0"/>
-              <a:t>9/27/2019</a:t>
+              <a:t>10/2/2019</a:t>
             </a:fld>
             <a:endParaRPr lang="en-US"/>
           </a:p>
@@ -2580,7 +2452,7 @@
           <a:p>
             <a:fld id="{23EC023D-B61A-4551-8136-DCD5A45A20F2}" type="datetimeFigureOut">
               <a:rPr lang="en-US" smtClean="0"/>
-              <a:t>9/27/2019</a:t>
+              <a:t>10/2/2019</a:t>
             </a:fld>
             <a:endParaRPr lang="en-US"/>
           </a:p>
@@ -2788,7 +2660,7 @@
           <a:p>
             <a:fld id="{23EC023D-B61A-4551-8136-DCD5A45A20F2}" type="datetimeFigureOut">
               <a:rPr lang="en-US" smtClean="0"/>
-              <a:t>9/27/2019</a:t>
+              <a:t>10/2/2019</a:t>
             </a:fld>
             <a:endParaRPr lang="en-US"/>
           </a:p>
@@ -5372,7 +5244,7 @@
           <a:p>
             <a:fld id="{23EC023D-B61A-4551-8136-DCD5A45A20F2}" type="datetimeFigureOut">
               <a:rPr lang="en-US" smtClean="0"/>
-              <a:t>9/27/2019</a:t>
+              <a:t>10/2/2019</a:t>
             </a:fld>
             <a:endParaRPr lang="en-US"/>
           </a:p>
@@ -5647,7 +5519,7 @@
           <a:p>
             <a:fld id="{23EC023D-B61A-4551-8136-DCD5A45A20F2}" type="datetimeFigureOut">
               <a:rPr lang="en-US" smtClean="0"/>
-              <a:t>9/27/2019</a:t>
+              <a:t>10/2/2019</a:t>
             </a:fld>
             <a:endParaRPr lang="en-US"/>
           </a:p>
@@ -5912,7 +5784,7 @@
           <a:p>
             <a:fld id="{23EC023D-B61A-4551-8136-DCD5A45A20F2}" type="datetimeFigureOut">
               <a:rPr lang="en-US" smtClean="0"/>
-              <a:t>9/27/2019</a:t>
+              <a:t>10/2/2019</a:t>
             </a:fld>
             <a:endParaRPr lang="en-US"/>
           </a:p>
@@ -6324,7 +6196,7 @@
           <a:p>
             <a:fld id="{23EC023D-B61A-4551-8136-DCD5A45A20F2}" type="datetimeFigureOut">
               <a:rPr lang="en-US" smtClean="0"/>
-              <a:t>9/27/2019</a:t>
+              <a:t>10/2/2019</a:t>
             </a:fld>
             <a:endParaRPr lang="en-US"/>
           </a:p>
@@ -6465,7 +6337,7 @@
           <a:p>
             <a:fld id="{23EC023D-B61A-4551-8136-DCD5A45A20F2}" type="datetimeFigureOut">
               <a:rPr lang="en-US" smtClean="0"/>
-              <a:t>9/27/2019</a:t>
+              <a:t>10/2/2019</a:t>
             </a:fld>
             <a:endParaRPr lang="en-US"/>
           </a:p>
@@ -6578,7 +6450,7 @@
           <a:p>
             <a:fld id="{23EC023D-B61A-4551-8136-DCD5A45A20F2}" type="datetimeFigureOut">
               <a:rPr lang="en-US" smtClean="0"/>
-              <a:t>9/27/2019</a:t>
+              <a:t>10/2/2019</a:t>
             </a:fld>
             <a:endParaRPr lang="en-US"/>
           </a:p>
@@ -6889,7 +6761,7 @@
           <a:p>
             <a:fld id="{23EC023D-B61A-4551-8136-DCD5A45A20F2}" type="datetimeFigureOut">
               <a:rPr lang="en-US" smtClean="0"/>
-              <a:t>9/27/2019</a:t>
+              <a:t>10/2/2019</a:t>
             </a:fld>
             <a:endParaRPr lang="en-US"/>
           </a:p>
@@ -7177,7 +7049,7 @@
           <a:p>
             <a:fld id="{23EC023D-B61A-4551-8136-DCD5A45A20F2}" type="datetimeFigureOut">
               <a:rPr lang="en-US" smtClean="0"/>
-              <a:t>9/27/2019</a:t>
+              <a:t>10/2/2019</a:t>
             </a:fld>
             <a:endParaRPr lang="en-US"/>
           </a:p>
@@ -7418,7 +7290,7 @@
           <a:p>
             <a:fld id="{23EC023D-B61A-4551-8136-DCD5A45A20F2}" type="datetimeFigureOut">
               <a:rPr lang="en-US" smtClean="0"/>
-              <a:t>9/27/2019</a:t>
+              <a:t>10/2/2019</a:t>
             </a:fld>
             <a:endParaRPr lang="en-US"/>
           </a:p>
@@ -8120,135 +7992,6 @@
   <p:cSld>
     <p:spTree>
       <p:nvGrpSpPr>
-        <p:cNvPr id="1" name="Shape 169"/>
-        <p:cNvGrpSpPr/>
-        <p:nvPr/>
-      </p:nvGrpSpPr>
-      <p:grpSpPr>
-        <a:xfrm>
-          <a:off x="0" y="0"/>
-          <a:ext cx="0" cy="0"/>
-          <a:chOff x="0" y="0"/>
-          <a:chExt cx="0" cy="0"/>
-        </a:xfrm>
-      </p:grpSpPr>
-      <p:sp>
-        <p:nvSpPr>
-          <p:cNvPr id="170" name="Google Shape;170;p32"/>
-          <p:cNvSpPr txBox="1">
-            <a:spLocks noGrp="1"/>
-          </p:cNvSpPr>
-          <p:nvPr>
-            <p:ph type="title"/>
-          </p:nvPr>
-        </p:nvSpPr>
-        <p:spPr>
-          <a:xfrm>
-            <a:off x="474633" y="1264300"/>
-            <a:ext cx="5664000" cy="2715600"/>
-          </a:xfrm>
-          <a:prstGeom prst="rect">
-            <a:avLst/>
-          </a:prstGeom>
-          <a:noFill/>
-          <a:ln>
-            <a:noFill/>
-          </a:ln>
-        </p:spPr>
-        <p:txBody>
-          <a:bodyPr spcFirstLastPara="1" vert="horz" wrap="square" lIns="121900" tIns="121900" rIns="121900" bIns="121900" rtlCol="0" anchor="b" anchorCtr="0">
-            <a:noAutofit/>
-          </a:bodyPr>
-          <a:lstStyle/>
-          <a:p>
-            <a:pPr>
-              <a:buClr>
-                <a:schemeClr val="dk1"/>
-              </a:buClr>
-              <a:buSzPts val="1100"/>
-            </a:pPr>
-            <a:r>
-              <a:rPr lang="zh-CN" altLang="en-US" sz="3200" dirty="0"/>
-              <a:t>模型预测</a:t>
-            </a:r>
-            <a:endParaRPr sz="3200" dirty="0"/>
-          </a:p>
-        </p:txBody>
-      </p:sp>
-      <p:pic>
-        <p:nvPicPr>
-          <p:cNvPr id="171" name="Google Shape;171;p32"/>
-          <p:cNvPicPr preferRelativeResize="0"/>
-          <p:nvPr/>
-        </p:nvPicPr>
-        <p:blipFill rotWithShape="1">
-          <a:blip r:embed="rId3">
-            <a:alphaModFix/>
-          </a:blip>
-          <a:srcRect l="47471" r="657"/>
-          <a:stretch/>
-        </p:blipFill>
-        <p:spPr>
-          <a:xfrm>
-            <a:off x="6862538" y="0"/>
-            <a:ext cx="5329469" cy="6858003"/>
-          </a:xfrm>
-          <a:prstGeom prst="rect">
-            <a:avLst/>
-          </a:prstGeom>
-          <a:noFill/>
-          <a:ln>
-            <a:noFill/>
-          </a:ln>
-        </p:spPr>
-      </p:pic>
-      <p:sp>
-        <p:nvSpPr>
-          <p:cNvPr id="172" name="Google Shape;172;p32"/>
-          <p:cNvSpPr txBox="1">
-            <a:spLocks noGrp="1"/>
-          </p:cNvSpPr>
-          <p:nvPr>
-            <p:ph type="title" idx="2"/>
-          </p:nvPr>
-        </p:nvSpPr>
-        <p:spPr>
-          <a:xfrm>
-            <a:off x="618633" y="3768867"/>
-            <a:ext cx="5376000" cy="2715600"/>
-          </a:xfrm>
-          <a:prstGeom prst="rect">
-            <a:avLst/>
-          </a:prstGeom>
-        </p:spPr>
-        <p:txBody>
-          <a:bodyPr spcFirstLastPara="1" vert="horz" wrap="square" lIns="121900" tIns="121900" rIns="121900" bIns="121900" rtlCol="0" anchor="t" anchorCtr="0">
-            <a:noAutofit/>
-          </a:bodyPr>
-          <a:lstStyle/>
-          <a:p>
-            <a:endParaRPr dirty="0"/>
-          </a:p>
-        </p:txBody>
-      </p:sp>
-    </p:spTree>
-    <p:extLst>
-      <p:ext uri="{BB962C8B-B14F-4D97-AF65-F5344CB8AC3E}">
-        <p14:creationId xmlns:p14="http://schemas.microsoft.com/office/powerpoint/2010/main" val="3397194256"/>
-      </p:ext>
-    </p:extLst>
-  </p:cSld>
-  <p:clrMapOvr>
-    <a:masterClrMapping/>
-  </p:clrMapOvr>
-</p:sld>
-</file>
-
-<file path=ppt/slides/slide12.xml><?xml version="1.0" encoding="utf-8"?>
-<p:sld xmlns:a="http://schemas.openxmlformats.org/drawingml/2006/main" xmlns:r="http://schemas.openxmlformats.org/officeDocument/2006/relationships" xmlns:p="http://schemas.openxmlformats.org/presentationml/2006/main">
-  <p:cSld>
-    <p:spTree>
-      <p:nvGrpSpPr>
         <p:cNvPr id="1" name="Shape 176"/>
         <p:cNvGrpSpPr/>
         <p:nvPr/>
@@ -8400,7 +8143,7 @@
 </p:sld>
 </file>
 
-<file path=ppt/slides/slide13.xml><?xml version="1.0" encoding="utf-8"?>
+<file path=ppt/slides/slide12.xml><?xml version="1.0" encoding="utf-8"?>
 <p:sld xmlns:a="http://schemas.openxmlformats.org/drawingml/2006/main" xmlns:r="http://schemas.openxmlformats.org/officeDocument/2006/relationships" xmlns:p="http://schemas.openxmlformats.org/presentationml/2006/main">
   <p:cSld>
     <p:spTree>
@@ -8586,7 +8329,7 @@
 </p:sld>
 </file>
 
-<file path=ppt/slides/slide14.xml><?xml version="1.0" encoding="utf-8"?>
+<file path=ppt/slides/slide13.xml><?xml version="1.0" encoding="utf-8"?>
 <p:sld xmlns:a="http://schemas.openxmlformats.org/drawingml/2006/main" xmlns:r="http://schemas.openxmlformats.org/officeDocument/2006/relationships" xmlns:p="http://schemas.openxmlformats.org/presentationml/2006/main">
   <p:cSld>
     <p:spTree>
@@ -9436,13 +9179,145 @@
           <a:lstStyle/>
           <a:p>
             <a:r>
-              <a:rPr lang="en-US" dirty="0">
-                <a:solidFill>
-                  <a:srgbClr val="858585"/>
-                </a:solidFill>
-              </a:rPr>
-              <a:t>Typically, we will use n to denote the number of samples in our dataset. We index the samples by I, denoting each input data point as                              and the corresponding label as </a:t>
-            </a:r>
+              <a:rPr lang="zh-CN" altLang="en-US" dirty="0"/>
+              <a:t>我们通常收集一系列的真实数据，例如多栋房屋的真实售出价格和它们对应的面积和房龄。我们希望在这个数据上面寻找模型参数来使模型的预测价格与真实价格的误差最小。在机器学习术语里，该数据集被称为训练数据集（</a:t>
+            </a:r>
+            <a:r>
+              <a:rPr lang="en-US" altLang="zh-CN" dirty="0"/>
+              <a:t>training data set</a:t>
+            </a:r>
+            <a:r>
+              <a:rPr lang="zh-CN" altLang="en-US" dirty="0"/>
+              <a:t>）或训练集（</a:t>
+            </a:r>
+            <a:r>
+              <a:rPr lang="en-US" altLang="zh-CN" dirty="0"/>
+              <a:t>training set</a:t>
+            </a:r>
+            <a:r>
+              <a:rPr lang="zh-CN" altLang="en-US" dirty="0"/>
+              <a:t>），一栋房屋被称为一个样本（</a:t>
+            </a:r>
+            <a:r>
+              <a:rPr lang="en-US" altLang="zh-CN" dirty="0"/>
+              <a:t>sample</a:t>
+            </a:r>
+            <a:r>
+              <a:rPr lang="zh-CN" altLang="en-US" dirty="0"/>
+              <a:t>），其真实售出价格叫作标签（</a:t>
+            </a:r>
+            <a:r>
+              <a:rPr lang="en-US" altLang="zh-CN" dirty="0"/>
+              <a:t>label</a:t>
+            </a:r>
+            <a:r>
+              <a:rPr lang="zh-CN" altLang="en-US" dirty="0"/>
+              <a:t>），用来预测标签的两个因素叫作特征（</a:t>
+            </a:r>
+            <a:r>
+              <a:rPr lang="en-US" altLang="zh-CN" dirty="0"/>
+              <a:t>feature</a:t>
+            </a:r>
+            <a:r>
+              <a:rPr lang="zh-CN" altLang="en-US" dirty="0"/>
+              <a:t>）。特征用来表征样本的特点。</a:t>
+            </a:r>
+            <a:br>
+              <a:rPr lang="en-US" altLang="zh-CN" dirty="0"/>
+            </a:br>
+            <a:br>
+              <a:rPr lang="en-US" altLang="zh-CN" dirty="0"/>
+            </a:br>
+            <a:r>
+              <a:rPr lang="zh-CN" altLang="en-US" dirty="0"/>
+              <a:t>假设我们采集的样本数为 </a:t>
+            </a:r>
+            <a:r>
+              <a:rPr lang="en-US" altLang="zh-CN" dirty="0"/>
+              <a:t>n </a:t>
+            </a:r>
+            <a:r>
+              <a:rPr lang="zh-CN" altLang="en-US" dirty="0"/>
+              <a:t>，索引为 </a:t>
+            </a:r>
+            <a:r>
+              <a:rPr lang="en-US" altLang="zh-CN" dirty="0" err="1"/>
+              <a:t>i</a:t>
+            </a:r>
+            <a:r>
+              <a:rPr lang="en-US" altLang="zh-CN" dirty="0"/>
+              <a:t> </a:t>
+            </a:r>
+            <a:r>
+              <a:rPr lang="zh-CN" altLang="en-US" dirty="0"/>
+              <a:t>的样本的特征为 </a:t>
+            </a:r>
+            <a:r>
+              <a:rPr lang="en-US" altLang="zh-CN" dirty="0"/>
+              <a:t>x(</a:t>
+            </a:r>
+            <a:r>
+              <a:rPr lang="en-US" altLang="zh-CN" dirty="0" err="1"/>
+              <a:t>i</a:t>
+            </a:r>
+            <a:r>
+              <a:rPr lang="en-US" altLang="zh-CN" dirty="0"/>
+              <a:t>)1 </a:t>
+            </a:r>
+            <a:r>
+              <a:rPr lang="zh-CN" altLang="en-US" dirty="0"/>
+              <a:t>和 </a:t>
+            </a:r>
+            <a:r>
+              <a:rPr lang="en-US" altLang="zh-CN" dirty="0"/>
+              <a:t>x(</a:t>
+            </a:r>
+            <a:r>
+              <a:rPr lang="en-US" altLang="zh-CN" dirty="0" err="1"/>
+              <a:t>i</a:t>
+            </a:r>
+            <a:r>
+              <a:rPr lang="en-US" altLang="zh-CN" dirty="0"/>
+              <a:t>)2 </a:t>
+            </a:r>
+            <a:r>
+              <a:rPr lang="zh-CN" altLang="en-US" dirty="0"/>
+              <a:t>，标签为 </a:t>
+            </a:r>
+            <a:r>
+              <a:rPr lang="en-US" altLang="zh-CN" dirty="0"/>
+              <a:t>y(</a:t>
+            </a:r>
+            <a:r>
+              <a:rPr lang="en-US" altLang="zh-CN" dirty="0" err="1"/>
+              <a:t>i</a:t>
+            </a:r>
+            <a:r>
+              <a:rPr lang="en-US" altLang="zh-CN" dirty="0"/>
+              <a:t>) </a:t>
+            </a:r>
+            <a:r>
+              <a:rPr lang="zh-CN" altLang="en-US" dirty="0"/>
+              <a:t>。对于索引为 </a:t>
+            </a:r>
+            <a:r>
+              <a:rPr lang="en-US" altLang="zh-CN" dirty="0" err="1"/>
+              <a:t>i</a:t>
+            </a:r>
+            <a:r>
+              <a:rPr lang="en-US" altLang="zh-CN" dirty="0"/>
+              <a:t> </a:t>
+            </a:r>
+            <a:r>
+              <a:rPr lang="zh-CN" altLang="en-US" dirty="0"/>
+              <a:t>的房屋，线性回归模型的房屋价格预测表达式为</a:t>
+            </a:r>
+            <a:br>
+              <a:rPr lang="en-US" altLang="zh-CN" dirty="0"/>
+            </a:br>
+            <a:br>
+              <a:rPr lang="en-US" altLang="zh-CN" dirty="0"/>
+            </a:br>
             <a:endParaRPr dirty="0">
               <a:solidFill>
                 <a:srgbClr val="858585"/>
@@ -9699,10 +9574,10 @@
       </p:sp>
       <p:pic>
         <p:nvPicPr>
-          <p:cNvPr id="17" name="Picture 16">
+          <p:cNvPr id="7" name="Picture 6">
             <a:extLst>
               <a:ext uri="{FF2B5EF4-FFF2-40B4-BE49-F238E27FC236}">
-                <a16:creationId xmlns:a16="http://schemas.microsoft.com/office/drawing/2014/main" id="{D6CC0452-A06D-433A-9518-1B73432FC714}"/>
+                <a16:creationId xmlns:a16="http://schemas.microsoft.com/office/drawing/2014/main" id="{9A94A96E-9B00-414F-AA08-ED24416ABD37}"/>
               </a:ext>
             </a:extLst>
           </p:cNvPr>
@@ -9725,44 +9600,8 @@
         </p:blipFill>
         <p:spPr>
           <a:xfrm>
-            <a:off x="8541680" y="1722130"/>
-            <a:ext cx="2016236" cy="541676"/>
-          </a:xfrm>
-          <a:prstGeom prst="rect">
-            <a:avLst/>
-          </a:prstGeom>
-        </p:spPr>
-      </p:pic>
-      <p:pic>
-        <p:nvPicPr>
-          <p:cNvPr id="19" name="Picture 18">
-            <a:extLst>
-              <a:ext uri="{FF2B5EF4-FFF2-40B4-BE49-F238E27FC236}">
-                <a16:creationId xmlns:a16="http://schemas.microsoft.com/office/drawing/2014/main" id="{E5DC5DB4-6F64-4CA6-8C4E-D4A2F939A373}"/>
-              </a:ext>
-            </a:extLst>
-          </p:cNvPr>
-          <p:cNvPicPr>
-            <a:picLocks noChangeAspect="1"/>
-          </p:cNvPicPr>
-          <p:nvPr/>
-        </p:nvPicPr>
-        <p:blipFill>
-          <a:blip r:embed="rId4">
-            <a:extLst>
-              <a:ext uri="{28A0092B-C50C-407E-A947-70E740481C1C}">
-                <a14:useLocalDpi xmlns:a14="http://schemas.microsoft.com/office/drawing/2010/main" val="0"/>
-              </a:ext>
-            </a:extLst>
-          </a:blip>
-          <a:stretch>
-            <a:fillRect/>
-          </a:stretch>
-        </p:blipFill>
-        <p:spPr>
-          <a:xfrm>
-            <a:off x="4288593" y="2122863"/>
-            <a:ext cx="457542" cy="442784"/>
+            <a:off x="4915711" y="5420291"/>
+            <a:ext cx="2164268" cy="449619"/>
           </a:xfrm>
           <a:prstGeom prst="rect">
             <a:avLst/>

</xml_diff>